<commit_message>
Update fig on pred outcome and caption for it
</commit_message>
<xml_diff>
--- a/figures/pptx files/fig_pred_viz.pptx
+++ b/figures/pptx files/fig_pred_viz.pptx
@@ -6,7 +6,8 @@
   </p:sldMasterIdLst>
   <p:sldIdLst>
     <p:sldId id="256" r:id="rId2"/>
-    <p:sldId id="258" r:id="rId3"/>
+    <p:sldId id="259" r:id="rId3"/>
+    <p:sldId id="258" r:id="rId4"/>
   </p:sldIdLst>
   <p:sldSz cx="18288000" cy="13716000"/>
   <p:notesSz cx="6858000" cy="9144000"/>
@@ -111,10 +112,14 @@
         <p14:section name="Default Section" id="{3902754D-7E1D-4E3A-8FB9-729AFF0EAA0D}">
           <p14:sldIdLst>
             <p14:sldId id="256"/>
+            <p14:sldId id="259"/>
             <p14:sldId id="258"/>
           </p14:sldIdLst>
         </p14:section>
       </p14:sectionLst>
+    </p:ext>
+    <p:ext uri="{EFAFB233-063F-42B5-8137-9DF3F51BA10A}">
+      <p15:sldGuideLst xmlns:p15="http://schemas.microsoft.com/office/powerpoint/2012/main"/>
     </p:ext>
   </p:extLst>
 </p:presentation>
@@ -3596,6 +3601,701 @@
         </p:blipFill>
         <p:spPr>
           <a:xfrm>
+            <a:off x="5158188" y="1317566"/>
+            <a:ext cx="3731386" cy="3132672"/>
+          </a:xfrm>
+          <a:prstGeom prst="rect">
+            <a:avLst/>
+          </a:prstGeom>
+        </p:spPr>
+      </p:pic>
+      <p:pic>
+        <p:nvPicPr>
+          <p:cNvPr id="7" name="Picture 6" descr="A picture containing wall, indoor&#10;&#10;Description automatically generated">
+            <a:extLst>
+              <a:ext uri="{FF2B5EF4-FFF2-40B4-BE49-F238E27FC236}">
+                <a16:creationId xmlns:a16="http://schemas.microsoft.com/office/drawing/2014/main" id="{C1AE7347-2278-422C-9A8B-6BF250332F34}"/>
+              </a:ext>
+            </a:extLst>
+          </p:cNvPr>
+          <p:cNvPicPr>
+            <a:picLocks noChangeAspect="1"/>
+          </p:cNvPicPr>
+          <p:nvPr/>
+        </p:nvPicPr>
+        <p:blipFill rotWithShape="1">
+          <a:blip r:embed="rId3">
+            <a:extLst>
+              <a:ext uri="{28A0092B-C50C-407E-A947-70E740481C1C}">
+                <a14:useLocalDpi xmlns:a14="http://schemas.microsoft.com/office/drawing/2010/main" val="0"/>
+              </a:ext>
+            </a:extLst>
+          </a:blip>
+          <a:srcRect l="45405" t="41751"/>
+          <a:stretch/>
+        </p:blipFill>
+        <p:spPr>
+          <a:xfrm>
+            <a:off x="1301691" y="1317570"/>
+            <a:ext cx="3731384" cy="3132669"/>
+          </a:xfrm>
+          <a:prstGeom prst="rect">
+            <a:avLst/>
+          </a:prstGeom>
+        </p:spPr>
+      </p:pic>
+      <p:pic>
+        <p:nvPicPr>
+          <p:cNvPr id="9" name="Picture 8" descr="A close up of a white wall&#10;&#10;Description automatically generated">
+            <a:extLst>
+              <a:ext uri="{FF2B5EF4-FFF2-40B4-BE49-F238E27FC236}">
+                <a16:creationId xmlns:a16="http://schemas.microsoft.com/office/drawing/2014/main" id="{AD6A89D0-F0C2-4690-9795-C8241DADB688}"/>
+              </a:ext>
+            </a:extLst>
+          </p:cNvPr>
+          <p:cNvPicPr>
+            <a:picLocks noChangeAspect="1"/>
+          </p:cNvPicPr>
+          <p:nvPr/>
+        </p:nvPicPr>
+        <p:blipFill rotWithShape="1">
+          <a:blip r:embed="rId4">
+            <a:extLst>
+              <a:ext uri="{28A0092B-C50C-407E-A947-70E740481C1C}">
+                <a14:useLocalDpi xmlns:a14="http://schemas.microsoft.com/office/drawing/2010/main" val="0"/>
+              </a:ext>
+            </a:extLst>
+          </a:blip>
+          <a:srcRect l="45405" t="41751"/>
+          <a:stretch/>
+        </p:blipFill>
+        <p:spPr>
+          <a:xfrm>
+            <a:off x="12871187" y="1317567"/>
+            <a:ext cx="3731383" cy="3132669"/>
+          </a:xfrm>
+          <a:prstGeom prst="rect">
+            <a:avLst/>
+          </a:prstGeom>
+        </p:spPr>
+      </p:pic>
+      <p:pic>
+        <p:nvPicPr>
+          <p:cNvPr id="11" name="Picture 10" descr="A picture containing wall, indoor&#10;&#10;Description automatically generated">
+            <a:extLst>
+              <a:ext uri="{FF2B5EF4-FFF2-40B4-BE49-F238E27FC236}">
+                <a16:creationId xmlns:a16="http://schemas.microsoft.com/office/drawing/2014/main" id="{B57745DB-FA4B-4C9E-9AB4-A448E3AC34C3}"/>
+              </a:ext>
+            </a:extLst>
+          </p:cNvPr>
+          <p:cNvPicPr>
+            <a:picLocks noChangeAspect="1"/>
+          </p:cNvPicPr>
+          <p:nvPr/>
+        </p:nvPicPr>
+        <p:blipFill rotWithShape="1">
+          <a:blip r:embed="rId5">
+            <a:extLst>
+              <a:ext uri="{28A0092B-C50C-407E-A947-70E740481C1C}">
+                <a14:useLocalDpi xmlns:a14="http://schemas.microsoft.com/office/drawing/2010/main" val="0"/>
+              </a:ext>
+            </a:extLst>
+          </a:blip>
+          <a:srcRect l="45405" t="41751" b="1"/>
+          <a:stretch/>
+        </p:blipFill>
+        <p:spPr>
+          <a:xfrm>
+            <a:off x="9014689" y="1317568"/>
+            <a:ext cx="3731382" cy="3132669"/>
+          </a:xfrm>
+          <a:prstGeom prst="rect">
+            <a:avLst/>
+          </a:prstGeom>
+        </p:spPr>
+      </p:pic>
+      <p:pic>
+        <p:nvPicPr>
+          <p:cNvPr id="21" name="Picture 20" descr="A picture containing wall&#10;&#10;Description automatically generated">
+            <a:extLst>
+              <a:ext uri="{FF2B5EF4-FFF2-40B4-BE49-F238E27FC236}">
+                <a16:creationId xmlns:a16="http://schemas.microsoft.com/office/drawing/2014/main" id="{D870D9A6-266C-4755-9C3B-1D9E90D2DCE2}"/>
+              </a:ext>
+            </a:extLst>
+          </p:cNvPr>
+          <p:cNvPicPr>
+            <a:picLocks noChangeAspect="1"/>
+          </p:cNvPicPr>
+          <p:nvPr/>
+        </p:nvPicPr>
+        <p:blipFill rotWithShape="1">
+          <a:blip r:embed="rId6">
+            <a:extLst>
+              <a:ext uri="{28A0092B-C50C-407E-A947-70E740481C1C}">
+                <a14:useLocalDpi xmlns:a14="http://schemas.microsoft.com/office/drawing/2010/main" val="0"/>
+              </a:ext>
+            </a:extLst>
+          </a:blip>
+          <a:srcRect l="9073" t="38419" r="37685" b="9158"/>
+          <a:stretch/>
+        </p:blipFill>
+        <p:spPr>
+          <a:xfrm>
+            <a:off x="1301691" y="4655324"/>
+            <a:ext cx="3712238" cy="2876203"/>
+          </a:xfrm>
+          <a:prstGeom prst="rect">
+            <a:avLst/>
+          </a:prstGeom>
+        </p:spPr>
+      </p:pic>
+      <p:pic>
+        <p:nvPicPr>
+          <p:cNvPr id="23" name="Picture 22">
+            <a:extLst>
+              <a:ext uri="{FF2B5EF4-FFF2-40B4-BE49-F238E27FC236}">
+                <a16:creationId xmlns:a16="http://schemas.microsoft.com/office/drawing/2014/main" id="{0C099779-A9FA-47E2-AAE4-FA807636A7A7}"/>
+              </a:ext>
+            </a:extLst>
+          </p:cNvPr>
+          <p:cNvPicPr>
+            <a:picLocks noChangeAspect="1"/>
+          </p:cNvPicPr>
+          <p:nvPr/>
+        </p:nvPicPr>
+        <p:blipFill rotWithShape="1">
+          <a:blip r:embed="rId7">
+            <a:extLst>
+              <a:ext uri="{28A0092B-C50C-407E-A947-70E740481C1C}">
+                <a14:useLocalDpi xmlns:a14="http://schemas.microsoft.com/office/drawing/2010/main" val="0"/>
+              </a:ext>
+            </a:extLst>
+          </a:blip>
+          <a:srcRect l="10197" t="39409" r="36835" b="8167"/>
+          <a:stretch/>
+        </p:blipFill>
+        <p:spPr>
+          <a:xfrm>
+            <a:off x="5139042" y="4625499"/>
+            <a:ext cx="3731386" cy="2906027"/>
+          </a:xfrm>
+          <a:prstGeom prst="rect">
+            <a:avLst/>
+          </a:prstGeom>
+        </p:spPr>
+      </p:pic>
+      <p:pic>
+        <p:nvPicPr>
+          <p:cNvPr id="25" name="Picture 24" descr="A picture containing wall, indoor&#10;&#10;Description automatically generated">
+            <a:extLst>
+              <a:ext uri="{FF2B5EF4-FFF2-40B4-BE49-F238E27FC236}">
+                <a16:creationId xmlns:a16="http://schemas.microsoft.com/office/drawing/2014/main" id="{76183EAD-995F-4AFA-80F7-CB26059EDB2C}"/>
+              </a:ext>
+            </a:extLst>
+          </p:cNvPr>
+          <p:cNvPicPr>
+            <a:picLocks noChangeAspect="1"/>
+          </p:cNvPicPr>
+          <p:nvPr/>
+        </p:nvPicPr>
+        <p:blipFill rotWithShape="1">
+          <a:blip r:embed="rId8">
+            <a:extLst>
+              <a:ext uri="{28A0092B-C50C-407E-A947-70E740481C1C}">
+                <a14:useLocalDpi xmlns:a14="http://schemas.microsoft.com/office/drawing/2010/main" val="0"/>
+              </a:ext>
+            </a:extLst>
+          </a:blip>
+          <a:srcRect l="8657" t="40075" r="37826" b="7500"/>
+          <a:stretch/>
+        </p:blipFill>
+        <p:spPr>
+          <a:xfrm>
+            <a:off x="8993013" y="4655323"/>
+            <a:ext cx="3731384" cy="2876204"/>
+          </a:xfrm>
+          <a:prstGeom prst="rect">
+            <a:avLst/>
+          </a:prstGeom>
+        </p:spPr>
+      </p:pic>
+      <p:pic>
+        <p:nvPicPr>
+          <p:cNvPr id="27" name="Picture 26" descr="A picture containing wall, indoor&#10;&#10;Description automatically generated">
+            <a:extLst>
+              <a:ext uri="{FF2B5EF4-FFF2-40B4-BE49-F238E27FC236}">
+                <a16:creationId xmlns:a16="http://schemas.microsoft.com/office/drawing/2014/main" id="{0E909A17-60D2-4A39-BC7F-4178879646BA}"/>
+              </a:ext>
+            </a:extLst>
+          </p:cNvPr>
+          <p:cNvPicPr>
+            <a:picLocks noChangeAspect="1"/>
+          </p:cNvPicPr>
+          <p:nvPr/>
+        </p:nvPicPr>
+        <p:blipFill rotWithShape="1">
+          <a:blip r:embed="rId9">
+            <a:extLst>
+              <a:ext uri="{28A0092B-C50C-407E-A947-70E740481C1C}">
+                <a14:useLocalDpi xmlns:a14="http://schemas.microsoft.com/office/drawing/2010/main" val="0"/>
+              </a:ext>
+            </a:extLst>
+          </a:blip>
+          <a:srcRect l="7900" t="40434" r="38272" b="7141"/>
+          <a:stretch/>
+        </p:blipFill>
+        <p:spPr>
+          <a:xfrm>
+            <a:off x="12849513" y="4655323"/>
+            <a:ext cx="3753057" cy="2876204"/>
+          </a:xfrm>
+          <a:prstGeom prst="rect">
+            <a:avLst/>
+          </a:prstGeom>
+        </p:spPr>
+      </p:pic>
+      <p:sp>
+        <p:nvSpPr>
+          <p:cNvPr id="28" name="TextBox 27">
+            <a:extLst>
+              <a:ext uri="{FF2B5EF4-FFF2-40B4-BE49-F238E27FC236}">
+                <a16:creationId xmlns:a16="http://schemas.microsoft.com/office/drawing/2014/main" id="{6F85A4F5-FC5F-4F8B-AAAA-456A335C8B4B}"/>
+              </a:ext>
+            </a:extLst>
+          </p:cNvPr>
+          <p:cNvSpPr txBox="1"/>
+          <p:nvPr/>
+        </p:nvSpPr>
+        <p:spPr>
+          <a:xfrm>
+            <a:off x="2605208" y="912429"/>
+            <a:ext cx="1124347" cy="400110"/>
+          </a:xfrm>
+          <a:prstGeom prst="rect">
+            <a:avLst/>
+          </a:prstGeom>
+          <a:noFill/>
+        </p:spPr>
+        <p:txBody>
+          <a:bodyPr wrap="none" rtlCol="0">
+            <a:spAutoFit/>
+          </a:bodyPr>
+          <a:lstStyle/>
+          <a:p>
+            <a:r>
+              <a:rPr lang="en-US" sz="2000" b="1" dirty="0"/>
+              <a:t>1 second</a:t>
+            </a:r>
+          </a:p>
+        </p:txBody>
+      </p:sp>
+      <p:sp>
+        <p:nvSpPr>
+          <p:cNvPr id="18" name="TextBox 17">
+            <a:extLst>
+              <a:ext uri="{FF2B5EF4-FFF2-40B4-BE49-F238E27FC236}">
+                <a16:creationId xmlns:a16="http://schemas.microsoft.com/office/drawing/2014/main" id="{A54225EF-6675-4ED9-887F-CD935DFDF5B3}"/>
+              </a:ext>
+            </a:extLst>
+          </p:cNvPr>
+          <p:cNvSpPr txBox="1"/>
+          <p:nvPr/>
+        </p:nvSpPr>
+        <p:spPr>
+          <a:xfrm>
+            <a:off x="6410412" y="908232"/>
+            <a:ext cx="1226939" cy="400110"/>
+          </a:xfrm>
+          <a:prstGeom prst="rect">
+            <a:avLst/>
+          </a:prstGeom>
+          <a:noFill/>
+        </p:spPr>
+        <p:txBody>
+          <a:bodyPr wrap="none" rtlCol="0">
+            <a:spAutoFit/>
+          </a:bodyPr>
+          <a:lstStyle/>
+          <a:p>
+            <a:r>
+              <a:rPr lang="en-US" sz="2000" b="1" dirty="0"/>
+              <a:t>3 seconds</a:t>
+            </a:r>
+          </a:p>
+        </p:txBody>
+      </p:sp>
+      <p:sp>
+        <p:nvSpPr>
+          <p:cNvPr id="19" name="TextBox 18">
+            <a:extLst>
+              <a:ext uri="{FF2B5EF4-FFF2-40B4-BE49-F238E27FC236}">
+                <a16:creationId xmlns:a16="http://schemas.microsoft.com/office/drawing/2014/main" id="{C1DA41BD-FF0C-4C14-9A43-41A0D7C5111E}"/>
+              </a:ext>
+            </a:extLst>
+          </p:cNvPr>
+          <p:cNvSpPr txBox="1"/>
+          <p:nvPr/>
+        </p:nvSpPr>
+        <p:spPr>
+          <a:xfrm>
+            <a:off x="10238734" y="917455"/>
+            <a:ext cx="1226939" cy="400110"/>
+          </a:xfrm>
+          <a:prstGeom prst="rect">
+            <a:avLst/>
+          </a:prstGeom>
+          <a:noFill/>
+        </p:spPr>
+        <p:txBody>
+          <a:bodyPr wrap="none" rtlCol="0">
+            <a:spAutoFit/>
+          </a:bodyPr>
+          <a:lstStyle/>
+          <a:p>
+            <a:r>
+              <a:rPr lang="en-US" sz="2000" b="1" dirty="0"/>
+              <a:t>5 seconds</a:t>
+            </a:r>
+          </a:p>
+        </p:txBody>
+      </p:sp>
+      <p:sp>
+        <p:nvSpPr>
+          <p:cNvPr id="20" name="TextBox 19">
+            <a:extLst>
+              <a:ext uri="{FF2B5EF4-FFF2-40B4-BE49-F238E27FC236}">
+                <a16:creationId xmlns:a16="http://schemas.microsoft.com/office/drawing/2014/main" id="{2A26697C-B14C-4020-A059-A379F923178F}"/>
+              </a:ext>
+            </a:extLst>
+          </p:cNvPr>
+          <p:cNvSpPr txBox="1"/>
+          <p:nvPr/>
+        </p:nvSpPr>
+        <p:spPr>
+          <a:xfrm>
+            <a:off x="14112571" y="917455"/>
+            <a:ext cx="1226939" cy="400110"/>
+          </a:xfrm>
+          <a:prstGeom prst="rect">
+            <a:avLst/>
+          </a:prstGeom>
+          <a:noFill/>
+        </p:spPr>
+        <p:txBody>
+          <a:bodyPr wrap="none" rtlCol="0">
+            <a:spAutoFit/>
+          </a:bodyPr>
+          <a:lstStyle/>
+          <a:p>
+            <a:r>
+              <a:rPr lang="en-US" sz="2000" b="1" dirty="0"/>
+              <a:t>7 seconds</a:t>
+            </a:r>
+          </a:p>
+        </p:txBody>
+      </p:sp>
+      <p:pic>
+        <p:nvPicPr>
+          <p:cNvPr id="22" name="Picture 21" descr="A picture containing indoor, wall&#10;&#10;Description automatically generated">
+            <a:extLst>
+              <a:ext uri="{FF2B5EF4-FFF2-40B4-BE49-F238E27FC236}">
+                <a16:creationId xmlns:a16="http://schemas.microsoft.com/office/drawing/2014/main" id="{C74C9232-C283-4598-A0A0-DCC958718C5E}"/>
+              </a:ext>
+            </a:extLst>
+          </p:cNvPr>
+          <p:cNvPicPr>
+            <a:picLocks noChangeAspect="1"/>
+          </p:cNvPicPr>
+          <p:nvPr/>
+        </p:nvPicPr>
+        <p:blipFill rotWithShape="1">
+          <a:blip r:embed="rId10">
+            <a:extLst>
+              <a:ext uri="{28A0092B-C50C-407E-A947-70E740481C1C}">
+                <a14:useLocalDpi xmlns:a14="http://schemas.microsoft.com/office/drawing/2010/main" val="0"/>
+              </a:ext>
+            </a:extLst>
+          </a:blip>
+          <a:srcRect l="5008" t="29761" r="17294" b="23045"/>
+          <a:stretch/>
+        </p:blipFill>
+        <p:spPr>
+          <a:xfrm>
+            <a:off x="1295546" y="7736613"/>
+            <a:ext cx="3718384" cy="1777198"/>
+          </a:xfrm>
+          <a:prstGeom prst="rect">
+            <a:avLst/>
+          </a:prstGeom>
+        </p:spPr>
+      </p:pic>
+      <p:pic>
+        <p:nvPicPr>
+          <p:cNvPr id="24" name="Picture 23" descr="A picture containing wall, indoor&#10;&#10;Description automatically generated">
+            <a:extLst>
+              <a:ext uri="{FF2B5EF4-FFF2-40B4-BE49-F238E27FC236}">
+                <a16:creationId xmlns:a16="http://schemas.microsoft.com/office/drawing/2014/main" id="{DC484705-DA3A-4579-B4CB-909B92FA9FB6}"/>
+              </a:ext>
+            </a:extLst>
+          </p:cNvPr>
+          <p:cNvPicPr>
+            <a:picLocks noChangeAspect="1"/>
+          </p:cNvPicPr>
+          <p:nvPr/>
+        </p:nvPicPr>
+        <p:blipFill rotWithShape="1">
+          <a:blip r:embed="rId11">
+            <a:extLst>
+              <a:ext uri="{28A0092B-C50C-407E-A947-70E740481C1C}">
+                <a14:useLocalDpi xmlns:a14="http://schemas.microsoft.com/office/drawing/2010/main" val="0"/>
+              </a:ext>
+            </a:extLst>
+          </a:blip>
+          <a:srcRect l="4880" t="30739" r="17420" b="22066"/>
+          <a:stretch/>
+        </p:blipFill>
+        <p:spPr>
+          <a:xfrm>
+            <a:off x="5171192" y="7736613"/>
+            <a:ext cx="3718382" cy="1777198"/>
+          </a:xfrm>
+          <a:prstGeom prst="rect">
+            <a:avLst/>
+          </a:prstGeom>
+        </p:spPr>
+      </p:pic>
+      <p:pic>
+        <p:nvPicPr>
+          <p:cNvPr id="26" name="Picture 25" descr="A picture containing wall, indoor&#10;&#10;Description automatically generated">
+            <a:extLst>
+              <a:ext uri="{FF2B5EF4-FFF2-40B4-BE49-F238E27FC236}">
+                <a16:creationId xmlns:a16="http://schemas.microsoft.com/office/drawing/2014/main" id="{FD8A0969-3237-4572-B3E4-88064EE9E331}"/>
+              </a:ext>
+            </a:extLst>
+          </p:cNvPr>
+          <p:cNvPicPr>
+            <a:picLocks noChangeAspect="1"/>
+          </p:cNvPicPr>
+          <p:nvPr/>
+        </p:nvPicPr>
+        <p:blipFill rotWithShape="1">
+          <a:blip r:embed="rId12">
+            <a:extLst>
+              <a:ext uri="{28A0092B-C50C-407E-A947-70E740481C1C}">
+                <a14:useLocalDpi xmlns:a14="http://schemas.microsoft.com/office/drawing/2010/main" val="0"/>
+              </a:ext>
+            </a:extLst>
+          </a:blip>
+          <a:srcRect l="7472" t="31001" r="14830" b="21805"/>
+          <a:stretch/>
+        </p:blipFill>
+        <p:spPr>
+          <a:xfrm>
+            <a:off x="8993013" y="7736613"/>
+            <a:ext cx="3718383" cy="1777198"/>
+          </a:xfrm>
+          <a:prstGeom prst="rect">
+            <a:avLst/>
+          </a:prstGeom>
+        </p:spPr>
+      </p:pic>
+      <p:pic>
+        <p:nvPicPr>
+          <p:cNvPr id="36" name="Picture 35" descr="A picture containing wall&#10;&#10;Description automatically generated">
+            <a:extLst>
+              <a:ext uri="{FF2B5EF4-FFF2-40B4-BE49-F238E27FC236}">
+                <a16:creationId xmlns:a16="http://schemas.microsoft.com/office/drawing/2014/main" id="{5856DC4F-A15E-4EE0-BBF7-61C197EF044C}"/>
+              </a:ext>
+            </a:extLst>
+          </p:cNvPr>
+          <p:cNvPicPr>
+            <a:picLocks noChangeAspect="1"/>
+          </p:cNvPicPr>
+          <p:nvPr/>
+        </p:nvPicPr>
+        <p:blipFill rotWithShape="1">
+          <a:blip r:embed="rId13">
+            <a:extLst>
+              <a:ext uri="{28A0092B-C50C-407E-A947-70E740481C1C}">
+                <a14:useLocalDpi xmlns:a14="http://schemas.microsoft.com/office/drawing/2010/main" val="0"/>
+              </a:ext>
+            </a:extLst>
+          </a:blip>
+          <a:srcRect l="7991" t="32140" r="14310" b="20666"/>
+          <a:stretch/>
+        </p:blipFill>
+        <p:spPr>
+          <a:xfrm>
+            <a:off x="12849513" y="7736613"/>
+            <a:ext cx="3753057" cy="1793770"/>
+          </a:xfrm>
+          <a:prstGeom prst="rect">
+            <a:avLst/>
+          </a:prstGeom>
+        </p:spPr>
+      </p:pic>
+      <p:sp>
+        <p:nvSpPr>
+          <p:cNvPr id="29" name="TextBox 28">
+            <a:extLst>
+              <a:ext uri="{FF2B5EF4-FFF2-40B4-BE49-F238E27FC236}">
+                <a16:creationId xmlns:a16="http://schemas.microsoft.com/office/drawing/2014/main" id="{27B0575F-687D-4DD0-A1B8-8B0890925E34}"/>
+              </a:ext>
+            </a:extLst>
+          </p:cNvPr>
+          <p:cNvSpPr txBox="1"/>
+          <p:nvPr/>
+        </p:nvSpPr>
+        <p:spPr>
+          <a:xfrm>
+            <a:off x="704971" y="2683846"/>
+            <a:ext cx="471604" cy="400110"/>
+          </a:xfrm>
+          <a:prstGeom prst="rect">
+            <a:avLst/>
+          </a:prstGeom>
+          <a:noFill/>
+        </p:spPr>
+        <p:txBody>
+          <a:bodyPr wrap="none" rtlCol="0">
+            <a:spAutoFit/>
+          </a:bodyPr>
+          <a:lstStyle/>
+          <a:p>
+            <a:r>
+              <a:rPr lang="en-US" sz="2000" b="1" dirty="0"/>
+              <a:t>(a)</a:t>
+            </a:r>
+          </a:p>
+        </p:txBody>
+      </p:sp>
+      <p:sp>
+        <p:nvSpPr>
+          <p:cNvPr id="30" name="TextBox 29">
+            <a:extLst>
+              <a:ext uri="{FF2B5EF4-FFF2-40B4-BE49-F238E27FC236}">
+                <a16:creationId xmlns:a16="http://schemas.microsoft.com/office/drawing/2014/main" id="{148D9EF8-42AB-4CFA-9545-CB30234C0AB4}"/>
+              </a:ext>
+            </a:extLst>
+          </p:cNvPr>
+          <p:cNvSpPr txBox="1"/>
+          <p:nvPr/>
+        </p:nvSpPr>
+        <p:spPr>
+          <a:xfrm>
+            <a:off x="704971" y="5878457"/>
+            <a:ext cx="482824" cy="400110"/>
+          </a:xfrm>
+          <a:prstGeom prst="rect">
+            <a:avLst/>
+          </a:prstGeom>
+          <a:noFill/>
+        </p:spPr>
+        <p:txBody>
+          <a:bodyPr wrap="none" rtlCol="0">
+            <a:spAutoFit/>
+          </a:bodyPr>
+          <a:lstStyle/>
+          <a:p>
+            <a:r>
+              <a:rPr lang="en-US" sz="2000" b="1" dirty="0"/>
+              <a:t>(b)</a:t>
+            </a:r>
+          </a:p>
+        </p:txBody>
+      </p:sp>
+      <p:sp>
+        <p:nvSpPr>
+          <p:cNvPr id="31" name="TextBox 30">
+            <a:extLst>
+              <a:ext uri="{FF2B5EF4-FFF2-40B4-BE49-F238E27FC236}">
+                <a16:creationId xmlns:a16="http://schemas.microsoft.com/office/drawing/2014/main" id="{724C0318-31EA-482C-9109-9C50C2EEECC5}"/>
+              </a:ext>
+            </a:extLst>
+          </p:cNvPr>
+          <p:cNvSpPr txBox="1"/>
+          <p:nvPr/>
+        </p:nvSpPr>
+        <p:spPr>
+          <a:xfrm>
+            <a:off x="704971" y="8425157"/>
+            <a:ext cx="452368" cy="400110"/>
+          </a:xfrm>
+          <a:prstGeom prst="rect">
+            <a:avLst/>
+          </a:prstGeom>
+          <a:noFill/>
+        </p:spPr>
+        <p:txBody>
+          <a:bodyPr wrap="none" rtlCol="0">
+            <a:spAutoFit/>
+          </a:bodyPr>
+          <a:lstStyle/>
+          <a:p>
+            <a:r>
+              <a:rPr lang="en-US" sz="2000" b="1" dirty="0"/>
+              <a:t>(c)</a:t>
+            </a:r>
+          </a:p>
+        </p:txBody>
+      </p:sp>
+    </p:spTree>
+    <p:extLst>
+      <p:ext uri="{BB962C8B-B14F-4D97-AF65-F5344CB8AC3E}">
+        <p14:creationId xmlns:p14="http://schemas.microsoft.com/office/powerpoint/2010/main" val="134088237"/>
+      </p:ext>
+    </p:extLst>
+  </p:cSld>
+  <p:clrMapOvr>
+    <a:masterClrMapping/>
+  </p:clrMapOvr>
+</p:sld>
+</file>
+
+<file path=ppt/slides/slide3.xml><?xml version="1.0" encoding="utf-8"?>
+<p:sld xmlns:a="http://schemas.openxmlformats.org/drawingml/2006/main" xmlns:r="http://schemas.openxmlformats.org/officeDocument/2006/relationships" xmlns:p="http://schemas.openxmlformats.org/presentationml/2006/main">
+  <p:cSld>
+    <p:spTree>
+      <p:nvGrpSpPr>
+        <p:cNvPr id="1" name=""/>
+        <p:cNvGrpSpPr/>
+        <p:nvPr/>
+      </p:nvGrpSpPr>
+      <p:grpSpPr>
+        <a:xfrm>
+          <a:off x="0" y="0"/>
+          <a:ext cx="0" cy="0"/>
+          <a:chOff x="0" y="0"/>
+          <a:chExt cx="0" cy="0"/>
+        </a:xfrm>
+      </p:grpSpPr>
+      <p:pic>
+        <p:nvPicPr>
+          <p:cNvPr id="5" name="Picture 4" descr="A picture containing wall, indoor&#10;&#10;Description automatically generated">
+            <a:extLst>
+              <a:ext uri="{FF2B5EF4-FFF2-40B4-BE49-F238E27FC236}">
+                <a16:creationId xmlns:a16="http://schemas.microsoft.com/office/drawing/2014/main" id="{6235EB9F-9A47-45FD-831B-8CFEE2CB650C}"/>
+              </a:ext>
+            </a:extLst>
+          </p:cNvPr>
+          <p:cNvPicPr>
+            <a:picLocks noChangeAspect="1"/>
+          </p:cNvPicPr>
+          <p:nvPr/>
+        </p:nvPicPr>
+        <p:blipFill rotWithShape="1">
+          <a:blip r:embed="rId2">
+            <a:extLst>
+              <a:ext uri="{28A0092B-C50C-407E-A947-70E740481C1C}">
+                <a14:useLocalDpi xmlns:a14="http://schemas.microsoft.com/office/drawing/2010/main" val="0"/>
+              </a:ext>
+            </a:extLst>
+          </a:blip>
+          <a:srcRect l="45405" t="41751"/>
+          <a:stretch/>
+        </p:blipFill>
+        <p:spPr>
+          <a:xfrm>
             <a:off x="6416149" y="935184"/>
             <a:ext cx="2689556" cy="2258007"/>
           </a:xfrm>

</xml_diff>

<commit_message>
Edit fig on pred result and caption of it
</commit_message>
<xml_diff>
--- a/figures/pptx files/fig_pred_viz.pptx
+++ b/figures/pptx files/fig_pred_viz.pptx
@@ -3868,7 +3868,7 @@
         </p:nvSpPr>
         <p:spPr>
           <a:xfrm>
-            <a:off x="2605208" y="912429"/>
+            <a:off x="2600307" y="921253"/>
             <a:ext cx="1124347" cy="400110"/>
           </a:xfrm>
           <a:prstGeom prst="rect">
@@ -3903,7 +3903,7 @@
         </p:nvSpPr>
         <p:spPr>
           <a:xfrm>
-            <a:off x="6410412" y="908232"/>
+            <a:off x="6414101" y="917455"/>
             <a:ext cx="1226939" cy="400110"/>
           </a:xfrm>
           <a:prstGeom prst="rect">
@@ -3919,7 +3919,7 @@
           <a:p>
             <a:r>
               <a:rPr lang="en-US" sz="2000" b="1" dirty="0"/>
-              <a:t>3 seconds</a:t>
+              <a:t>2 seconds</a:t>
             </a:r>
           </a:p>
         </p:txBody>
@@ -3938,7 +3938,7 @@
         </p:nvSpPr>
         <p:spPr>
           <a:xfrm>
-            <a:off x="10238734" y="917455"/>
+            <a:off x="10245235" y="921253"/>
             <a:ext cx="1226939" cy="400110"/>
           </a:xfrm>
           <a:prstGeom prst="rect">
@@ -3954,7 +3954,7 @@
           <a:p>
             <a:r>
               <a:rPr lang="en-US" sz="2000" b="1" dirty="0"/>
-              <a:t>5 seconds</a:t>
+              <a:t>3 seconds</a:t>
             </a:r>
           </a:p>
         </p:txBody>
@@ -3973,7 +3973,7 @@
         </p:nvSpPr>
         <p:spPr>
           <a:xfrm>
-            <a:off x="14112571" y="917455"/>
+            <a:off x="14112571" y="912425"/>
             <a:ext cx="1226939" cy="400110"/>
           </a:xfrm>
           <a:prstGeom prst="rect">
@@ -3989,7 +3989,7 @@
           <a:p>
             <a:r>
               <a:rPr lang="en-US" sz="2000" b="1" dirty="0"/>
-              <a:t>7 seconds</a:t>
+              <a:t>4 seconds</a:t>
             </a:r>
           </a:p>
         </p:txBody>
@@ -4148,7 +4148,7 @@
         </p:nvSpPr>
         <p:spPr>
           <a:xfrm>
-            <a:off x="704971" y="2683846"/>
+            <a:off x="814699" y="2683846"/>
             <a:ext cx="471604" cy="400110"/>
           </a:xfrm>
           <a:prstGeom prst="rect">
@@ -4183,7 +4183,7 @@
         </p:nvSpPr>
         <p:spPr>
           <a:xfrm>
-            <a:off x="704971" y="5878457"/>
+            <a:off x="814699" y="5878457"/>
             <a:ext cx="482824" cy="400110"/>
           </a:xfrm>
           <a:prstGeom prst="rect">
@@ -4218,7 +4218,7 @@
         </p:nvSpPr>
         <p:spPr>
           <a:xfrm>
-            <a:off x="704971" y="8425157"/>
+            <a:off x="814699" y="8425157"/>
             <a:ext cx="452368" cy="400110"/>
           </a:xfrm>
           <a:prstGeom prst="rect">

</xml_diff>